<commit_message>
commit from git bash
</commit_message>
<xml_diff>
--- a/Restore in-place of a warehouse in Fabric.pptx
+++ b/Restore in-place of a warehouse in Fabric.pptx
@@ -9,7 +9,7 @@
   </p:notesMasterIdLst>
   <p:sldIdLst>
     <p:sldId id="256" r:id="rId2"/>
-    <p:sldId id="264" r:id="rId3"/>
+    <p:sldId id="268" r:id="rId3"/>
     <p:sldId id="257" r:id="rId4"/>
     <p:sldId id="265" r:id="rId5"/>
     <p:sldId id="266" r:id="rId6"/>
@@ -112,13 +112,18 @@
       </a:defRPr>
     </a:lvl9pPr>
   </p:defaultTextStyle>
+  <p:extLst>
+    <p:ext uri="{EFAFB233-063F-42B5-8137-9DF3F51BA10A}">
+      <p15:sldGuideLst xmlns:p15="http://schemas.microsoft.com/office/powerpoint/2012/main"/>
+    </p:ext>
+  </p:extLst>
 </p:presentation>
 </file>
 
 <file path=ppt/revisionInfo.xml><?xml version="1.0" encoding="utf-8"?>
 <p1510:revInfo xmlns:a="http://schemas.openxmlformats.org/drawingml/2006/main" xmlns:r="http://schemas.openxmlformats.org/officeDocument/2006/relationships" xmlns:p1510="http://schemas.microsoft.com/office/powerpoint/2015/10/main">
   <p1510:revLst>
-    <p1510:client id="{27C8ABB1-8F7F-4418-818E-A8CF03CC644F}" v="16" dt="2024-02-02T18:50:29.080"/>
+    <p1510:client id="{27C8ABB1-8F7F-4418-818E-A8CF03CC644F}" v="17" dt="2024-02-03T11:07:08.987"/>
   </p1510:revLst>
 </p1510:revInfo>
 </file>
@@ -128,7 +133,7 @@
   <pc:docChgLst>
     <pc:chgData name="T D, Vinodh Kumar" userId="383876b5-9234-4d6b-b4c6-7f48ca388427" providerId="ADAL" clId="{27C8ABB1-8F7F-4418-818E-A8CF03CC644F}"/>
     <pc:docChg chg="undo custSel addSld delSld modSld">
-      <pc:chgData name="T D, Vinodh Kumar" userId="383876b5-9234-4d6b-b4c6-7f48ca388427" providerId="ADAL" clId="{27C8ABB1-8F7F-4418-818E-A8CF03CC644F}" dt="2024-02-02T19:58:18.805" v="944" actId="478"/>
+      <pc:chgData name="T D, Vinodh Kumar" userId="383876b5-9234-4d6b-b4c6-7f48ca388427" providerId="ADAL" clId="{27C8ABB1-8F7F-4418-818E-A8CF03CC644F}" dt="2024-02-03T11:07:11.738" v="946" actId="47"/>
       <pc:docMkLst>
         <pc:docMk/>
       </pc:docMkLst>
@@ -161,6 +166,13 @@
             <ac:spMk id="3" creationId="{AE0D9584-8A89-EEB8-7E2F-D3D9303FEFC0}"/>
           </ac:spMkLst>
         </pc:spChg>
+      </pc:sldChg>
+      <pc:sldChg chg="del">
+        <pc:chgData name="T D, Vinodh Kumar" userId="383876b5-9234-4d6b-b4c6-7f48ca388427" providerId="ADAL" clId="{27C8ABB1-8F7F-4418-818E-A8CF03CC644F}" dt="2024-02-03T11:07:11.738" v="946" actId="47"/>
+        <pc:sldMkLst>
+          <pc:docMk/>
+          <pc:sldMk cId="2596329654" sldId="264"/>
+        </pc:sldMkLst>
       </pc:sldChg>
       <pc:sldChg chg="modSp mod">
         <pc:chgData name="T D, Vinodh Kumar" userId="383876b5-9234-4d6b-b4c6-7f48ca388427" providerId="ADAL" clId="{27C8ABB1-8F7F-4418-818E-A8CF03CC644F}" dt="2024-02-02T18:51:22.653" v="891" actId="5793"/>
@@ -262,6 +274,13 @@
           <pc:sldMk cId="3908580013" sldId="267"/>
         </pc:sldMkLst>
       </pc:sldChg>
+      <pc:sldChg chg="add">
+        <pc:chgData name="T D, Vinodh Kumar" userId="383876b5-9234-4d6b-b4c6-7f48ca388427" providerId="ADAL" clId="{27C8ABB1-8F7F-4418-818E-A8CF03CC644F}" dt="2024-02-03T11:07:08.985" v="945"/>
+        <pc:sldMkLst>
+          <pc:docMk/>
+          <pc:sldMk cId="3682206310" sldId="268"/>
+        </pc:sldMkLst>
+      </pc:sldChg>
     </pc:docChg>
   </pc:docChgLst>
 </pc:chgInfo>
@@ -349,7 +368,7 @@
           <a:p>
             <a:fld id="{239E372A-4B72-4D55-9C84-1EAC27E0DBD9}" type="datetimeFigureOut">
               <a:rPr lang="en-IN" smtClean="0"/>
-              <a:t>02-02-2024</a:t>
+              <a:t>03-02-2024</a:t>
             </a:fld>
             <a:endParaRPr lang="en-IN"/>
           </a:p>
@@ -617,90 +636,6 @@
 </p:notesMaster>
 </file>
 
-<file path=ppt/notesSlides/notesSlide1.xml><?xml version="1.0" encoding="utf-8"?>
-<p:notes xmlns:a="http://schemas.openxmlformats.org/drawingml/2006/main" xmlns:r="http://schemas.openxmlformats.org/officeDocument/2006/relationships" xmlns:p="http://schemas.openxmlformats.org/presentationml/2006/main">
-  <p:cSld>
-    <p:spTree>
-      <p:nvGrpSpPr>
-        <p:cNvPr id="1" name=""/>
-        <p:cNvGrpSpPr/>
-        <p:nvPr/>
-      </p:nvGrpSpPr>
-      <p:grpSpPr>
-        <a:xfrm>
-          <a:off x="0" y="0"/>
-          <a:ext cx="0" cy="0"/>
-          <a:chOff x="0" y="0"/>
-          <a:chExt cx="0" cy="0"/>
-        </a:xfrm>
-      </p:grpSpPr>
-      <p:sp>
-        <p:nvSpPr>
-          <p:cNvPr id="2" name="Slide Image Placeholder 1"/>
-          <p:cNvSpPr>
-            <a:spLocks noGrp="1" noRot="1" noChangeAspect="1"/>
-          </p:cNvSpPr>
-          <p:nvPr>
-            <p:ph type="sldImg"/>
-          </p:nvPr>
-        </p:nvSpPr>
-        <p:spPr/>
-      </p:sp>
-      <p:sp>
-        <p:nvSpPr>
-          <p:cNvPr id="3" name="Notes Placeholder 2"/>
-          <p:cNvSpPr>
-            <a:spLocks noGrp="1"/>
-          </p:cNvSpPr>
-          <p:nvPr>
-            <p:ph type="body" idx="1"/>
-          </p:nvPr>
-        </p:nvSpPr>
-        <p:spPr/>
-        <p:txBody>
-          <a:bodyPr/>
-          <a:lstStyle/>
-          <a:p>
-            <a:endParaRPr lang="en-IN" dirty="0"/>
-          </a:p>
-        </p:txBody>
-      </p:sp>
-      <p:sp>
-        <p:nvSpPr>
-          <p:cNvPr id="4" name="Slide Number Placeholder 3"/>
-          <p:cNvSpPr>
-            <a:spLocks noGrp="1"/>
-          </p:cNvSpPr>
-          <p:nvPr>
-            <p:ph type="sldNum" sz="quarter" idx="5"/>
-          </p:nvPr>
-        </p:nvSpPr>
-        <p:spPr/>
-        <p:txBody>
-          <a:bodyPr/>
-          <a:lstStyle/>
-          <a:p>
-            <a:fld id="{32B9799E-7343-410A-BF3C-A382ED0BF50B}" type="slidenum">
-              <a:rPr lang="en-IN" smtClean="0"/>
-              <a:t>2</a:t>
-            </a:fld>
-            <a:endParaRPr lang="en-IN"/>
-          </a:p>
-        </p:txBody>
-      </p:sp>
-    </p:spTree>
-    <p:extLst>
-      <p:ext uri="{BB962C8B-B14F-4D97-AF65-F5344CB8AC3E}">
-        <p14:creationId xmlns:p14="http://schemas.microsoft.com/office/powerpoint/2010/main" val="3788739995"/>
-      </p:ext>
-    </p:extLst>
-  </p:cSld>
-  <p:clrMapOvr>
-    <a:masterClrMapping/>
-  </p:clrMapOvr>
-</p:notes>
-</file>
-
 <file path=ppt/slideLayouts/slideLayout1.xml><?xml version="1.0" encoding="utf-8"?>
 <p:sldLayout xmlns:a="http://schemas.openxmlformats.org/drawingml/2006/main" xmlns:r="http://schemas.openxmlformats.org/officeDocument/2006/relationships" xmlns:p="http://schemas.openxmlformats.org/presentationml/2006/main" type="title" preserve="1">
   <p:cSld name="Title Slide">
@@ -850,7 +785,7 @@
           <a:p>
             <a:fld id="{B918E9EC-354B-4EF4-A886-7B87491D4A7F}" type="datetimeFigureOut">
               <a:rPr lang="en-IN" smtClean="0"/>
-              <a:t>02-02-2024</a:t>
+              <a:t>03-02-2024</a:t>
             </a:fld>
             <a:endParaRPr lang="en-IN"/>
           </a:p>
@@ -1050,7 +985,7 @@
           <a:p>
             <a:fld id="{B918E9EC-354B-4EF4-A886-7B87491D4A7F}" type="datetimeFigureOut">
               <a:rPr lang="en-IN" smtClean="0"/>
-              <a:t>02-02-2024</a:t>
+              <a:t>03-02-2024</a:t>
             </a:fld>
             <a:endParaRPr lang="en-IN"/>
           </a:p>
@@ -1260,7 +1195,7 @@
           <a:p>
             <a:fld id="{B918E9EC-354B-4EF4-A886-7B87491D4A7F}" type="datetimeFigureOut">
               <a:rPr lang="en-IN" smtClean="0"/>
-              <a:t>02-02-2024</a:t>
+              <a:t>03-02-2024</a:t>
             </a:fld>
             <a:endParaRPr lang="en-IN"/>
           </a:p>
@@ -1460,7 +1395,7 @@
           <a:p>
             <a:fld id="{B918E9EC-354B-4EF4-A886-7B87491D4A7F}" type="datetimeFigureOut">
               <a:rPr lang="en-IN" smtClean="0"/>
-              <a:t>02-02-2024</a:t>
+              <a:t>03-02-2024</a:t>
             </a:fld>
             <a:endParaRPr lang="en-IN"/>
           </a:p>
@@ -1736,7 +1671,7 @@
           <a:p>
             <a:fld id="{B918E9EC-354B-4EF4-A886-7B87491D4A7F}" type="datetimeFigureOut">
               <a:rPr lang="en-IN" smtClean="0"/>
-              <a:t>02-02-2024</a:t>
+              <a:t>03-02-2024</a:t>
             </a:fld>
             <a:endParaRPr lang="en-IN"/>
           </a:p>
@@ -2004,7 +1939,7 @@
           <a:p>
             <a:fld id="{B918E9EC-354B-4EF4-A886-7B87491D4A7F}" type="datetimeFigureOut">
               <a:rPr lang="en-IN" smtClean="0"/>
-              <a:t>02-02-2024</a:t>
+              <a:t>03-02-2024</a:t>
             </a:fld>
             <a:endParaRPr lang="en-IN"/>
           </a:p>
@@ -2419,7 +2354,7 @@
           <a:p>
             <a:fld id="{B918E9EC-354B-4EF4-A886-7B87491D4A7F}" type="datetimeFigureOut">
               <a:rPr lang="en-IN" smtClean="0"/>
-              <a:t>02-02-2024</a:t>
+              <a:t>03-02-2024</a:t>
             </a:fld>
             <a:endParaRPr lang="en-IN"/>
           </a:p>
@@ -2561,7 +2496,7 @@
           <a:p>
             <a:fld id="{B918E9EC-354B-4EF4-A886-7B87491D4A7F}" type="datetimeFigureOut">
               <a:rPr lang="en-IN" smtClean="0"/>
-              <a:t>02-02-2024</a:t>
+              <a:t>03-02-2024</a:t>
             </a:fld>
             <a:endParaRPr lang="en-IN"/>
           </a:p>
@@ -2674,7 +2609,7 @@
           <a:p>
             <a:fld id="{B918E9EC-354B-4EF4-A886-7B87491D4A7F}" type="datetimeFigureOut">
               <a:rPr lang="en-IN" smtClean="0"/>
-              <a:t>02-02-2024</a:t>
+              <a:t>03-02-2024</a:t>
             </a:fld>
             <a:endParaRPr lang="en-IN"/>
           </a:p>
@@ -2987,7 +2922,7 @@
           <a:p>
             <a:fld id="{B918E9EC-354B-4EF4-A886-7B87491D4A7F}" type="datetimeFigureOut">
               <a:rPr lang="en-IN" smtClean="0"/>
-              <a:t>02-02-2024</a:t>
+              <a:t>03-02-2024</a:t>
             </a:fld>
             <a:endParaRPr lang="en-IN"/>
           </a:p>
@@ -3276,7 +3211,7 @@
           <a:p>
             <a:fld id="{B918E9EC-354B-4EF4-A886-7B87491D4A7F}" type="datetimeFigureOut">
               <a:rPr lang="en-IN" smtClean="0"/>
-              <a:t>02-02-2024</a:t>
+              <a:t>03-02-2024</a:t>
             </a:fld>
             <a:endParaRPr lang="en-IN"/>
           </a:p>
@@ -3519,7 +3454,7 @@
           <a:p>
             <a:fld id="{B918E9EC-354B-4EF4-A886-7B87491D4A7F}" type="datetimeFigureOut">
               <a:rPr lang="en-IN" smtClean="0"/>
-              <a:t>02-02-2024</a:t>
+              <a:t>03-02-2024</a:t>
             </a:fld>
             <a:endParaRPr lang="en-IN"/>
           </a:p>
@@ -4061,8 +3996,8 @@
         </p:nvSpPr>
         <p:spPr>
           <a:xfrm>
-            <a:off x="838200" y="639763"/>
-            <a:ext cx="10515600" cy="5717976"/>
+            <a:off x="436757" y="126808"/>
+            <a:ext cx="10515600" cy="6742872"/>
           </a:xfrm>
           <a:prstGeom prst="rect">
             <a:avLst/>
@@ -4087,7 +4022,7 @@
             <a:pPr marL="0" indent="0">
               <a:buNone/>
             </a:pPr>
-            <a:endParaRPr lang="en-US" dirty="0"/>
+            <a:endParaRPr lang="en-US" sz="2400" dirty="0"/>
           </a:p>
           <a:p>
             <a:pPr marL="0" indent="0">
@@ -4095,18 +4030,8 @@
             </a:pPr>
             <a:r>
               <a:rPr lang="en-US" dirty="0"/>
-              <a:t>Vinodh Kumar TD </a:t>
-            </a:r>
-          </a:p>
-          <a:p>
-            <a:pPr marL="0" indent="0">
-              <a:buNone/>
-            </a:pPr>
-            <a:r>
-              <a:rPr lang="en-US" sz="2000" dirty="0"/>
-              <a:t>Cloud Data Architect, Presidio</a:t>
-            </a:r>
-            <a:endParaRPr lang="en-US" sz="2400" dirty="0"/>
+              <a:t>Vinodh Kumar TD</a:t>
+            </a:r>
           </a:p>
           <a:p>
             <a:pPr marL="0" indent="0">
@@ -4121,8 +4046,8 @@
               </a:spcAft>
             </a:pPr>
             <a:r>
-              <a:rPr lang="en-US" dirty="0"/>
-              <a:t>Microsoft Certified Trainer x3</a:t>
+              <a:rPr lang="en-US" sz="2000" dirty="0"/>
+              <a:t>Cloud Data Architect</a:t>
             </a:r>
           </a:p>
           <a:p>
@@ -4132,8 +4057,8 @@
               </a:spcAft>
             </a:pPr>
             <a:r>
-              <a:rPr lang="en-US" dirty="0"/>
-              <a:t>Global Speaker</a:t>
+              <a:rPr lang="en-US" sz="2000" dirty="0"/>
+              <a:t>12 Years of experience in Data Technologies</a:t>
             </a:r>
           </a:p>
           <a:p>
@@ -4143,16 +4068,60 @@
               </a:spcAft>
             </a:pPr>
             <a:r>
-              <a:rPr lang="en-US" dirty="0"/>
-              <a:t>Data Blogger @</a:t>
-            </a:r>
-            <a:r>
-              <a:rPr lang="en-US" dirty="0">
+              <a:rPr lang="en-US" sz="2000" dirty="0"/>
+              <a:t>Microsoft Certified Trainer x3</a:t>
+            </a:r>
+          </a:p>
+          <a:p>
+            <a:pPr>
+              <a:spcAft>
+                <a:spcPts val="600"/>
+              </a:spcAft>
+            </a:pPr>
+            <a:r>
+              <a:rPr lang="en-US" sz="2000" dirty="0"/>
+              <a:t>C#SharpCorner MVP x3</a:t>
+            </a:r>
+          </a:p>
+          <a:p>
+            <a:pPr>
+              <a:spcAft>
+                <a:spcPts val="600"/>
+              </a:spcAft>
+            </a:pPr>
+            <a:r>
+              <a:rPr lang="en-US" sz="2000" dirty="0"/>
+              <a:t>Microsoft Community Champion</a:t>
+            </a:r>
+          </a:p>
+          <a:p>
+            <a:pPr>
+              <a:spcAft>
+                <a:spcPts val="600"/>
+              </a:spcAft>
+            </a:pPr>
+            <a:r>
+              <a:rPr lang="en-US" sz="2000" dirty="0"/>
+              <a:t>Global Speaker</a:t>
+            </a:r>
+          </a:p>
+          <a:p>
+            <a:pPr>
+              <a:spcAft>
+                <a:spcPts val="600"/>
+              </a:spcAft>
+            </a:pPr>
+            <a:r>
+              <a:rPr lang="en-US" sz="2000" dirty="0"/>
+              <a:t>Data Blogger </a:t>
+            </a:r>
+            <a:r>
+              <a:rPr lang="en-US" sz="2000" dirty="0">
                 <a:sym typeface="Wingdings" pitchFamily="2" charset="2"/>
               </a:rPr>
-              <a:t> 	vinsdata.wordpress.com</a:t>
-            </a:r>
-            <a:endParaRPr lang="en-US" dirty="0"/>
+              <a:t> 	vinsdata.wordpress.com</a:t>
+            </a:r>
+            <a:endParaRPr lang="en-US" sz="2000" dirty="0"/>
           </a:p>
           <a:p>
             <a:pPr marL="2743200" lvl="6" indent="0">
@@ -4162,8 +4131,8 @@
               <a:buNone/>
             </a:pPr>
             <a:r>
-              <a:rPr lang="en-IN" sz="2400" dirty="0">
-                <a:hlinkClick r:id="rId3">
+              <a:rPr lang="en-IN" sz="2000" dirty="0">
+                <a:hlinkClick r:id="rId2">
                   <a:extLst>
                     <a:ext uri="{A12FA001-AC4F-418D-AE19-62706E023703}">
                       <ahyp:hlinkClr xmlns:ahyp="http://schemas.microsoft.com/office/drawing/2018/hyperlinkcolor" val="tx"/>
@@ -4173,7 +4142,7 @@
               </a:rPr>
               <a:t>Vinodh Kumar (c-sharpcorner.com)</a:t>
             </a:r>
-            <a:endParaRPr lang="en-US" sz="2400" dirty="0"/>
+            <a:endParaRPr lang="en-US" sz="2000" dirty="0"/>
           </a:p>
           <a:p>
             <a:endParaRPr lang="en-US" dirty="0"/>
@@ -4185,10 +4154,188 @@
       </p:sp>
       <p:pic>
         <p:nvPicPr>
-          <p:cNvPr id="4" name="Picture 3" descr="A person taking a selfie&#10;&#10;Description automatically generated">
-            <a:extLst>
-              <a:ext uri="{FF2B5EF4-FFF2-40B4-BE49-F238E27FC236}">
-                <a16:creationId xmlns:a16="http://schemas.microsoft.com/office/drawing/2014/main" id="{FD7312FE-F325-639D-5FA2-D65E222EF666}"/>
+          <p:cNvPr id="4" name="Picture 3" descr="Shape">
+            <a:hlinkClick r:id="rId3"/>
+            <a:extLst>
+              <a:ext uri="{FF2B5EF4-FFF2-40B4-BE49-F238E27FC236}">
+                <a16:creationId xmlns:a16="http://schemas.microsoft.com/office/drawing/2014/main" id="{92630FF9-5C10-8BB5-1D4C-A7BAE55789A4}"/>
+              </a:ext>
+            </a:extLst>
+          </p:cNvPr>
+          <p:cNvPicPr>
+            <a:picLocks noChangeAspect="1"/>
+          </p:cNvPicPr>
+          <p:nvPr/>
+        </p:nvPicPr>
+        <p:blipFill>
+          <a:blip r:embed="rId4">
+            <a:extLst>
+              <a:ext uri="{28A0092B-C50C-407E-A947-70E740481C1C}">
+                <a14:useLocalDpi xmlns:a14="http://schemas.microsoft.com/office/drawing/2010/main" val="0"/>
+              </a:ext>
+            </a:extLst>
+          </a:blip>
+          <a:stretch>
+            <a:fillRect/>
+          </a:stretch>
+        </p:blipFill>
+        <p:spPr>
+          <a:xfrm>
+            <a:off x="109847" y="5418000"/>
+            <a:ext cx="1436401" cy="1440000"/>
+          </a:xfrm>
+          <a:prstGeom prst="rect">
+            <a:avLst/>
+          </a:prstGeom>
+        </p:spPr>
+      </p:pic>
+      <p:pic>
+        <p:nvPicPr>
+          <p:cNvPr id="5" name="Picture 14" descr="Image result for linkedin logo">
+            <a:hlinkClick r:id="rId5"/>
+            <a:extLst>
+              <a:ext uri="{FF2B5EF4-FFF2-40B4-BE49-F238E27FC236}">
+                <a16:creationId xmlns:a16="http://schemas.microsoft.com/office/drawing/2014/main" id="{B7C75943-EE13-1AE4-148F-7DC8BCA709C3}"/>
+              </a:ext>
+            </a:extLst>
+          </p:cNvPr>
+          <p:cNvPicPr>
+            <a:picLocks noChangeAspect="1" noChangeArrowheads="1"/>
+          </p:cNvPicPr>
+          <p:nvPr/>
+        </p:nvPicPr>
+        <p:blipFill>
+          <a:blip r:embed="rId6">
+            <a:extLst>
+              <a:ext uri="{28A0092B-C50C-407E-A947-70E740481C1C}">
+                <a14:useLocalDpi xmlns:a14="http://schemas.microsoft.com/office/drawing/2010/main" val="0"/>
+              </a:ext>
+            </a:extLst>
+          </a:blip>
+          <a:stretch>
+            <a:fillRect/>
+          </a:stretch>
+        </p:blipFill>
+        <p:spPr bwMode="auto">
+          <a:xfrm>
+            <a:off x="3126508" y="5891340"/>
+            <a:ext cx="720000" cy="720000"/>
+          </a:xfrm>
+          <a:prstGeom prst="rect">
+            <a:avLst/>
+          </a:prstGeom>
+          <a:noFill/>
+          <a:extLst>
+            <a:ext uri="{909E8E84-426E-40DD-AFC4-6F175D3DCCD1}">
+              <a14:hiddenFill xmlns:a14="http://schemas.microsoft.com/office/drawing/2010/main">
+                <a:solidFill>
+                  <a:srgbClr val="FFFFFF"/>
+                </a:solidFill>
+              </a14:hiddenFill>
+            </a:ext>
+          </a:extLst>
+        </p:spPr>
+      </p:pic>
+      <p:pic>
+        <p:nvPicPr>
+          <p:cNvPr id="6" name="Picture 12" descr="Image result for twitter logo">
+            <a:hlinkClick r:id="rId7"/>
+            <a:extLst>
+              <a:ext uri="{FF2B5EF4-FFF2-40B4-BE49-F238E27FC236}">
+                <a16:creationId xmlns:a16="http://schemas.microsoft.com/office/drawing/2014/main" id="{32B48ADB-116F-877D-F97E-E46F973374CE}"/>
+              </a:ext>
+            </a:extLst>
+          </p:cNvPr>
+          <p:cNvPicPr>
+            <a:picLocks noChangeAspect="1" noChangeArrowheads="1"/>
+          </p:cNvPicPr>
+          <p:nvPr/>
+        </p:nvPicPr>
+        <p:blipFill>
+          <a:blip r:embed="rId8">
+            <a:extLst>
+              <a:ext uri="{28A0092B-C50C-407E-A947-70E740481C1C}">
+                <a14:useLocalDpi xmlns:a14="http://schemas.microsoft.com/office/drawing/2010/main" val="0"/>
+              </a:ext>
+            </a:extLst>
+          </a:blip>
+          <a:stretch>
+            <a:fillRect/>
+          </a:stretch>
+        </p:blipFill>
+        <p:spPr bwMode="auto">
+          <a:xfrm>
+            <a:off x="4132512" y="5764532"/>
+            <a:ext cx="966660" cy="966660"/>
+          </a:xfrm>
+          <a:prstGeom prst="rect">
+            <a:avLst/>
+          </a:prstGeom>
+          <a:noFill/>
+          <a:extLst>
+            <a:ext uri="{909E8E84-426E-40DD-AFC4-6F175D3DCCD1}">
+              <a14:hiddenFill xmlns:a14="http://schemas.microsoft.com/office/drawing/2010/main">
+                <a:solidFill>
+                  <a:srgbClr val="FFFFFF"/>
+                </a:solidFill>
+              </a14:hiddenFill>
+            </a:ext>
+          </a:extLst>
+        </p:spPr>
+      </p:pic>
+      <p:pic>
+        <p:nvPicPr>
+          <p:cNvPr id="7" name="Picture 16" descr="Image result for c# corner logo">
+            <a:hlinkClick r:id="rId2"/>
+            <a:extLst>
+              <a:ext uri="{FF2B5EF4-FFF2-40B4-BE49-F238E27FC236}">
+                <a16:creationId xmlns:a16="http://schemas.microsoft.com/office/drawing/2014/main" id="{108D9CA1-8BCD-0C7F-4A6F-2AF6A0B156D9}"/>
+              </a:ext>
+            </a:extLst>
+          </p:cNvPr>
+          <p:cNvPicPr>
+            <a:picLocks noChangeAspect="1" noChangeArrowheads="1"/>
+          </p:cNvPicPr>
+          <p:nvPr/>
+        </p:nvPicPr>
+        <p:blipFill>
+          <a:blip r:embed="rId9">
+            <a:extLst>
+              <a:ext uri="{28A0092B-C50C-407E-A947-70E740481C1C}">
+                <a14:useLocalDpi xmlns:a14="http://schemas.microsoft.com/office/drawing/2010/main" val="0"/>
+              </a:ext>
+            </a:extLst>
+          </a:blip>
+          <a:stretch>
+            <a:fillRect/>
+          </a:stretch>
+        </p:blipFill>
+        <p:spPr bwMode="auto">
+          <a:xfrm>
+            <a:off x="1402377" y="5418000"/>
+            <a:ext cx="1440000" cy="1440000"/>
+          </a:xfrm>
+          <a:prstGeom prst="rect">
+            <a:avLst/>
+          </a:prstGeom>
+          <a:noFill/>
+          <a:extLst>
+            <a:ext uri="{909E8E84-426E-40DD-AFC4-6F175D3DCCD1}">
+              <a14:hiddenFill xmlns:a14="http://schemas.microsoft.com/office/drawing/2010/main">
+                <a:solidFill>
+                  <a:srgbClr val="FFFFFF"/>
+                </a:solidFill>
+              </a14:hiddenFill>
+            </a:ext>
+          </a:extLst>
+        </p:spPr>
+      </p:pic>
+      <p:pic>
+        <p:nvPicPr>
+          <p:cNvPr id="3" name="Picture 2" descr="A person taking a selfie&#10;&#10;Description automatically generated">
+            <a:extLst>
+              <a:ext uri="{FF2B5EF4-FFF2-40B4-BE49-F238E27FC236}">
+                <a16:creationId xmlns:a16="http://schemas.microsoft.com/office/drawing/2014/main" id="{90482E9E-3440-0C68-0E63-670A388680D6}"/>
               </a:ext>
             </a:extLst>
           </p:cNvPr>
@@ -4198,7 +4345,7 @@
           <p:nvPr/>
         </p:nvPicPr>
         <p:blipFill rotWithShape="1">
-          <a:blip r:embed="rId4">
+          <a:blip r:embed="rId10">
             <a:extLst>
               <a:ext uri="{28A0092B-C50C-407E-A947-70E740481C1C}">
                 <a14:useLocalDpi xmlns:a14="http://schemas.microsoft.com/office/drawing/2010/main" val="0"/>
@@ -4210,8 +4357,8 @@
         </p:blipFill>
         <p:spPr>
           <a:xfrm>
-            <a:off x="8686800" y="877887"/>
-            <a:ext cx="2667000" cy="4456113"/>
+            <a:off x="8285357" y="668881"/>
+            <a:ext cx="2993910" cy="5002325"/>
           </a:xfrm>
           <a:prstGeom prst="rect">
             <a:avLst/>
@@ -4221,7 +4368,7 @@
     </p:spTree>
     <p:extLst>
       <p:ext uri="{BB962C8B-B14F-4D97-AF65-F5344CB8AC3E}">
-        <p14:creationId xmlns:p14="http://schemas.microsoft.com/office/powerpoint/2010/main" val="2596329654"/>
+        <p14:creationId xmlns:p14="http://schemas.microsoft.com/office/powerpoint/2010/main" val="3682206310"/>
       </p:ext>
     </p:extLst>
   </p:cSld>

</xml_diff>